<commit_message>
Update Arduino/libraries, Documents, and ROS/coverage_path_planner
</commit_message>
<xml_diff>
--- a/Documents/UVC_Robot_IEEE_Poster.pptx
+++ b/Documents/UVC_Robot_IEEE_Poster.pptx
@@ -198,6 +198,7 @@
     <p1510:client id="{383106A7-0C3B-4EEF-9437-EA3AE0DCA79F}" v="536" dt="2022-03-17T13:36:53.830"/>
     <p1510:client id="{62709F34-8262-DDAC-D6D7-28D44B135346}" v="243" dt="2022-03-21T22:56:13.339"/>
     <p1510:client id="{6A38B56D-974A-CC8D-BEF1-8EFD73933552}" v="10" dt="2022-03-18T01:51:54.450"/>
+    <p1510:client id="{6E7F0C38-9153-6EAC-CA91-8BB7733EF4A9}" v="5" dt="2022-03-22T13:21:59.435"/>
     <p1510:client id="{A1A6D6E1-80F7-3B76-C1E5-6F2855C5D0B8}" v="4" dt="2022-03-21T23:01:50.871"/>
     <p1510:client id="{BA5AF2A1-F416-70DC-E568-761C5858FA1D}" v="41" dt="2022-03-20T12:52:41.790"/>
     <p1510:client id="{E7465721-DF8D-5A10-0DFB-4062E1DCDD62}" v="27" dt="2022-03-17T20:35:25.241"/>
@@ -6519,7 +6520,7 @@
         </p:nvSpPr>
         <p:spPr>
           <a:xfrm>
-            <a:off x="1270000" y="24170495"/>
+            <a:off x="946150" y="24170495"/>
             <a:ext cx="6858000" cy="492443"/>
           </a:xfrm>
           <a:prstGeom prst="rect">
@@ -6559,7 +6560,7 @@
         </p:nvSpPr>
         <p:spPr>
           <a:xfrm>
-            <a:off x="11631168" y="21355978"/>
+            <a:off x="11796795" y="21438792"/>
             <a:ext cx="6858000" cy="492443"/>
           </a:xfrm>
           <a:prstGeom prst="rect">
@@ -9065,8 +9066,8 @@
         </p:nvSpPr>
         <p:spPr>
           <a:xfrm>
-            <a:off x="22231312" y="17176624"/>
-            <a:ext cx="9760267" cy="5293757"/>
+            <a:off x="22231312" y="17157574"/>
+            <a:ext cx="9722167" cy="5293757"/>
           </a:xfrm>
           <a:prstGeom prst="rect">
             <a:avLst/>

</xml_diff>